<commit_message>
Added some changes to Requirements
</commit_message>
<xml_diff>
--- a/Requirements.pptx
+++ b/Requirements.pptx
@@ -6,6 +6,7 @@
   </p:sldMasterIdLst>
   <p:sldIdLst>
     <p:sldId id="256" r:id="rId2"/>
+    <p:sldId id="257" r:id="rId3"/>
   </p:sldIdLst>
   <p:sldSz cx="9144000" cy="6858000" type="screen4x3"/>
   <p:notesSz cx="6858000" cy="9144000"/>
@@ -3097,47 +3098,53 @@
       </p:grpSpPr>
       <p:sp>
         <p:nvSpPr>
-          <p:cNvPr id="2" name="Title 1"/>
-          <p:cNvSpPr>
-            <a:spLocks noGrp="1"/>
-          </p:cNvSpPr>
-          <p:nvPr>
-            <p:ph type="ctrTitle"/>
-          </p:nvPr>
-        </p:nvSpPr>
-        <p:spPr/>
-        <p:txBody>
-          <a:bodyPr/>
-          <a:lstStyle/>
-          <a:p>
-            <a:r>
-              <a:rPr lang="en-GB" dirty="0" smtClean="0"/>
-              <a:t>Project </a:t>
-            </a:r>
-            <a:r>
-              <a:rPr lang="en-GB" dirty="0" err="1" smtClean="0"/>
-              <a:t>Te</a:t>
-            </a:r>
-            <a:endParaRPr lang="en-GB" dirty="0"/>
-          </a:p>
-        </p:txBody>
-      </p:sp>
-      <p:sp>
-        <p:nvSpPr>
-          <p:cNvPr id="3" name="Subtitle 2"/>
-          <p:cNvSpPr>
-            <a:spLocks noGrp="1"/>
-          </p:cNvSpPr>
-          <p:nvPr>
-            <p:ph type="subTitle" idx="1"/>
-          </p:nvPr>
-        </p:nvSpPr>
-        <p:spPr/>
-        <p:txBody>
-          <a:bodyPr/>
-          <a:lstStyle/>
-          <a:p>
-            <a:endParaRPr lang="en-GB"/>
+          <p:cNvPr id="4" name="Title 1"/>
+          <p:cNvSpPr txBox="1">
+            <a:spLocks/>
+          </p:cNvSpPr>
+          <p:nvPr/>
+        </p:nvSpPr>
+        <p:spPr>
+          <a:xfrm>
+            <a:off x="152400" y="2282825"/>
+            <a:ext cx="9144000" cy="1470025"/>
+          </a:xfrm>
+          <a:prstGeom prst="rect">
+            <a:avLst/>
+          </a:prstGeom>
+        </p:spPr>
+        <p:txBody>
+          <a:bodyPr vert="horz" lIns="91440" tIns="45720" rIns="91440" bIns="45720" rtlCol="0" anchor="ctr">
+            <a:normAutofit/>
+          </a:bodyPr>
+          <a:lstStyle>
+            <a:lvl1pPr algn="ctr" defTabSz="457200" rtl="0" eaLnBrk="1" latinLnBrk="0" hangingPunct="1">
+              <a:spcBef>
+                <a:spcPct val="0"/>
+              </a:spcBef>
+              <a:buNone/>
+              <a:defRPr sz="4400" kern="1200">
+                <a:solidFill>
+                  <a:schemeClr val="tx1"/>
+                </a:solidFill>
+                <a:latin typeface="+mj-lt"/>
+                <a:ea typeface="+mj-ea"/>
+                <a:cs typeface="+mj-cs"/>
+              </a:defRPr>
+            </a:lvl1pPr>
+          </a:lstStyle>
+          <a:p>
+            <a:r>
+              <a:rPr lang="en-GB" sz="7200" smtClean="0">
+                <a:latin typeface="Avenir Light"/>
+                <a:cs typeface="Avenir Light"/>
+              </a:rPr>
+              <a:t>Arcturus </a:t>
+            </a:r>
+            <a:endParaRPr lang="en-GB" sz="7200" dirty="0">
+              <a:latin typeface="Avenir Light"/>
+              <a:cs typeface="Avenir Light"/>
+            </a:endParaRPr>
           </a:p>
         </p:txBody>
       </p:sp>
@@ -3145,6 +3152,109 @@
     <p:extLst>
       <p:ext uri="{BB962C8B-B14F-4D97-AF65-F5344CB8AC3E}">
         <p14:creationId xmlns:p14="http://schemas.microsoft.com/office/powerpoint/2010/main" val="3244020585"/>
+      </p:ext>
+    </p:extLst>
+  </p:cSld>
+  <p:clrMapOvr>
+    <a:masterClrMapping/>
+  </p:clrMapOvr>
+</p:sld>
+</file>
+
+<file path=ppt/slides/slide2.xml><?xml version="1.0" encoding="utf-8"?>
+<p:sld xmlns:a="http://schemas.openxmlformats.org/drawingml/2006/main" xmlns:r="http://schemas.openxmlformats.org/officeDocument/2006/relationships" xmlns:p="http://schemas.openxmlformats.org/presentationml/2006/main">
+  <p:cSld>
+    <p:spTree>
+      <p:nvGrpSpPr>
+        <p:cNvPr id="1" name=""/>
+        <p:cNvGrpSpPr/>
+        <p:nvPr/>
+      </p:nvGrpSpPr>
+      <p:grpSpPr>
+        <a:xfrm>
+          <a:off x="0" y="0"/>
+          <a:ext cx="0" cy="0"/>
+          <a:chOff x="0" y="0"/>
+          <a:chExt cx="0" cy="0"/>
+        </a:xfrm>
+      </p:grpSpPr>
+      <p:sp>
+        <p:nvSpPr>
+          <p:cNvPr id="2" name="TextBox 1"/>
+          <p:cNvSpPr txBox="1"/>
+          <p:nvPr/>
+        </p:nvSpPr>
+        <p:spPr>
+          <a:xfrm>
+            <a:off x="1" y="2400562"/>
+            <a:ext cx="9144000" cy="1569660"/>
+          </a:xfrm>
+          <a:prstGeom prst="rect">
+            <a:avLst/>
+          </a:prstGeom>
+          <a:noFill/>
+        </p:spPr>
+        <p:txBody>
+          <a:bodyPr wrap="square" rtlCol="0">
+            <a:spAutoFit/>
+          </a:bodyPr>
+          <a:lstStyle/>
+          <a:p>
+            <a:pPr marL="457200" indent="-457200" algn="ctr">
+              <a:buFont typeface="Courier New"/>
+              <a:buChar char="o"/>
+            </a:pPr>
+            <a:r>
+              <a:rPr lang="en-GB" sz="3200" dirty="0" err="1" smtClean="0">
+                <a:latin typeface="Avenir Light"/>
+                <a:cs typeface="Avenir Light"/>
+              </a:rPr>
+              <a:t>Astrophotograph</a:t>
+            </a:r>
+            <a:r>
+              <a:rPr lang="en-GB" sz="3200" dirty="0" smtClean="0">
+                <a:latin typeface="Avenir Light"/>
+                <a:cs typeface="Avenir Light"/>
+              </a:rPr>
+              <a:t> Processing</a:t>
+            </a:r>
+          </a:p>
+          <a:p>
+            <a:pPr marL="457200" indent="-457200" algn="ctr">
+              <a:buFont typeface="Courier New"/>
+              <a:buChar char="o"/>
+            </a:pPr>
+            <a:r>
+              <a:rPr lang="en-GB" sz="3200" dirty="0" smtClean="0">
+                <a:latin typeface="Avenir Light"/>
+                <a:cs typeface="Avenir Light"/>
+              </a:rPr>
+              <a:t>Simple and Powerful</a:t>
+            </a:r>
+          </a:p>
+          <a:p>
+            <a:pPr marL="457200" indent="-457200" algn="ctr">
+              <a:buFont typeface="Courier New"/>
+              <a:buChar char="o"/>
+            </a:pPr>
+            <a:r>
+              <a:rPr lang="en-GB" sz="3200" dirty="0" err="1" smtClean="0">
+                <a:latin typeface="Avenir Light"/>
+                <a:cs typeface="Avenir Light"/>
+              </a:rPr>
+              <a:t>JavaFX</a:t>
+            </a:r>
+            <a:endParaRPr lang="en-GB" sz="3200" dirty="0" smtClean="0">
+              <a:latin typeface="Avenir Light"/>
+              <a:cs typeface="Avenir Light"/>
+            </a:endParaRPr>
+          </a:p>
+        </p:txBody>
+      </p:sp>
+    </p:spTree>
+    <p:extLst>
+      <p:ext uri="{BB962C8B-B14F-4D97-AF65-F5344CB8AC3E}">
+        <p14:creationId xmlns:p14="http://schemas.microsoft.com/office/powerpoint/2010/main" val="428819812"/>
       </p:ext>
     </p:extLst>
   </p:cSld>

</xml_diff>